<commit_message>
Added powerpoint slides for constitution and specify
</commit_message>
<xml_diff>
--- a/Day_2/slides/Day_2_Specify_slides.pptx
+++ b/Day_2/slides/Day_2_Specify_slides.pptx
@@ -4,6 +4,9 @@
   <p:sldMasterIdLst>
     <p:sldMasterId id="2147483648" r:id="rId1"/>
   </p:sldMasterIdLst>
+  <p:notesMasterIdLst>
+    <p:notesMasterId r:id="rId9"/>
+  </p:notesMasterIdLst>
   <p:sldIdLst>
     <p:sldId id="256" r:id="rId2"/>
     <p:sldId id="257" r:id="rId3"/>
@@ -13,9 +16,6 @@
     <p:sldId id="261" r:id="rId7"/>
     <p:sldId id="262" r:id="rId8"/>
   </p:sldIdLst>
-  <p:notesMasterIdLst>
-    <p:notesMasterId r:id="rId9"/>
-  </p:notesMasterIdLst>
   <p:sldSz cx="12192000" cy="6858000"/>
   <p:notesSz cx="6858000" cy="12192000"/>
   <p:defaultTextStyle>
@@ -110,6 +110,11 @@
       </a:defRPr>
     </a:lvl9pPr>
   </p:defaultTextStyle>
+  <p:extLst>
+    <p:ext uri="{EFAFB233-063F-42B5-8137-9DF3F51BA10A}">
+      <p15:sldGuideLst xmlns:p15="http://schemas.microsoft.com/office/powerpoint/2012/main"/>
+    </p:ext>
+  </p:extLst>
 </p:presentation>
 </file>
 
@@ -135,234 +140,10 @@
           <a:chExt cx="0" cy="0"/>
         </a:xfrm>
       </p:grpSpPr>
-      <p:sp>
-        <p:nvSpPr>
-          <p:cNvPr id="2" name="Header Placeholder 1"/>
-          <p:cNvSpPr>
-            <a:spLocks noGrp="1"/>
-          </p:cNvSpPr>
-          <p:nvPr>
-            <p:ph type="hdr" sz="quarter"/>
-          </p:nvPr>
-        </p:nvSpPr>
-        <p:spPr>
-          <a:xfrm>
-            <a:off x="0" y="0"/>
-            <a:ext cx="2971800" cy="458788"/>
-          </a:xfrm>
-          <a:prstGeom prst="rect">
-            <a:avLst/>
-          </a:prstGeom>
-        </p:spPr>
-        <p:txBody>
-          <a:bodyPr vert="horz" lIns="91440" tIns="45720" rIns="91440" bIns="45720" rtlCol="0"/>
-          <a:lstStyle>
-            <a:lvl1pPr algn="l">
-              <a:defRPr sz="1200"/>
-            </a:lvl1pPr>
-          </a:lstStyle>
-          <a:p>
-            <a:endParaRPr lang="en-US"/>
-          </a:p>
-        </p:txBody>
-      </p:sp>
-      <p:sp>
-        <p:nvSpPr>
-          <p:cNvPr id="3" name="Date Placeholder 2"/>
-          <p:cNvSpPr>
-            <a:spLocks noGrp="1"/>
-          </p:cNvSpPr>
-          <p:nvPr>
-            <p:ph type="dt" idx="1"/>
-          </p:nvPr>
-        </p:nvSpPr>
-        <p:spPr>
-          <a:xfrm>
-            <a:off x="3884613" y="0"/>
-            <a:ext cx="2971800" cy="458788"/>
-          </a:xfrm>
-          <a:prstGeom prst="rect">
-            <a:avLst/>
-          </a:prstGeom>
-        </p:spPr>
-        <p:txBody>
-          <a:bodyPr vert="horz" lIns="91440" tIns="45720" rIns="91440" bIns="45720" rtlCol="0"/>
-          <a:lstStyle>
-            <a:lvl1pPr algn="r">
-              <a:defRPr sz="1200"/>
-            </a:lvl1pPr>
-          </a:lstStyle>
-          <a:p>
-            <a:fld id="{5282F153-3F37-0F45-9E97-73ACFA13230C}" type="datetimeFigureOut">
-              <a:rPr lang="en-US"/>
-              <a:t>7/23/19</a:t>
-            </a:fld>
-            <a:endParaRPr lang="en-US"/>
-          </a:p>
-        </p:txBody>
-      </p:sp>
-      <p:sp>
-        <p:nvSpPr>
-          <p:cNvPr id="4" name="Slide Image Placeholder 3"/>
-          <p:cNvSpPr>
-            <a:spLocks noGrp="1" noRot="1" noChangeAspect="1"/>
-          </p:cNvSpPr>
-          <p:nvPr>
-            <p:ph type="sldImg" idx="2"/>
-          </p:nvPr>
-        </p:nvSpPr>
-        <p:spPr>
-          <a:xfrm>
-            <a:off x="685800" y="1143000"/>
-            <a:ext cx="5486400" cy="3086100"/>
-          </a:xfrm>
-          <a:prstGeom prst="rect">
-            <a:avLst/>
-          </a:prstGeom>
-          <a:noFill/>
-          <a:ln w="12700">
-            <a:solidFill>
-              <a:prstClr val="black"/>
-            </a:solidFill>
-          </a:ln>
-        </p:spPr>
-        <p:txBody>
-          <a:bodyPr vert="horz" lIns="91440" tIns="45720" rIns="91440" bIns="45720" rtlCol="0" anchor="ctr"/>
-          <a:lstStyle/>
-          <a:p>
-            <a:endParaRPr lang="en-US"/>
-          </a:p>
-        </p:txBody>
-      </p:sp>
-      <p:sp>
-        <p:nvSpPr>
-          <p:cNvPr id="5" name="Notes Placeholder 4"/>
-          <p:cNvSpPr>
-            <a:spLocks noGrp="1"/>
-          </p:cNvSpPr>
-          <p:nvPr>
-            <p:ph type="body" sz="quarter" idx="3"/>
-          </p:nvPr>
-        </p:nvSpPr>
-        <p:spPr>
-          <a:xfrm>
-            <a:off x="685800" y="4400550"/>
-            <a:ext cx="5486400" cy="3600450"/>
-          </a:xfrm>
-          <a:prstGeom prst="rect">
-            <a:avLst/>
-          </a:prstGeom>
-        </p:spPr>
-        <p:txBody>
-          <a:bodyPr vert="horz" lIns="91440" tIns="45720" rIns="91440" bIns="45720" rtlCol="0"/>
-          <a:lstStyle/>
-          <a:p>
-            <a:pPr lvl="0"/>
-            <a:r>
-              <a:rPr lang="en-US"/>
-              <a:t>Click to edit Master text styles</a:t>
-            </a:r>
-          </a:p>
-          <a:p>
-            <a:pPr lvl="1"/>
-            <a:r>
-              <a:rPr lang="en-US"/>
-              <a:t>Second level</a:t>
-            </a:r>
-          </a:p>
-          <a:p>
-            <a:pPr lvl="2"/>
-            <a:r>
-              <a:rPr lang="en-US"/>
-              <a:t>Third level</a:t>
-            </a:r>
-          </a:p>
-          <a:p>
-            <a:pPr lvl="3"/>
-            <a:r>
-              <a:rPr lang="en-US"/>
-              <a:t>Fourth level</a:t>
-            </a:r>
-          </a:p>
-          <a:p>
-            <a:pPr lvl="4"/>
-            <a:r>
-              <a:rPr lang="en-US"/>
-              <a:t>Fifth level</a:t>
-            </a:r>
-          </a:p>
-        </p:txBody>
-      </p:sp>
-      <p:sp>
-        <p:nvSpPr>
-          <p:cNvPr id="6" name="Footer Placeholder 5"/>
-          <p:cNvSpPr>
-            <a:spLocks noGrp="1"/>
-          </p:cNvSpPr>
-          <p:nvPr>
-            <p:ph type="ftr" sz="quarter" idx="4"/>
-          </p:nvPr>
-        </p:nvSpPr>
-        <p:spPr>
-          <a:xfrm>
-            <a:off x="0" y="8685213"/>
-            <a:ext cx="2971800" cy="458787"/>
-          </a:xfrm>
-          <a:prstGeom prst="rect">
-            <a:avLst/>
-          </a:prstGeom>
-        </p:spPr>
-        <p:txBody>
-          <a:bodyPr vert="horz" lIns="91440" tIns="45720" rIns="91440" bIns="45720" rtlCol="0" anchor="b"/>
-          <a:lstStyle>
-            <a:lvl1pPr algn="l">
-              <a:defRPr sz="1200"/>
-            </a:lvl1pPr>
-          </a:lstStyle>
-          <a:p>
-            <a:endParaRPr lang="en-US"/>
-          </a:p>
-        </p:txBody>
-      </p:sp>
-      <p:sp>
-        <p:nvSpPr>
-          <p:cNvPr id="7" name="Slide Number Placeholder 6"/>
-          <p:cNvSpPr>
-            <a:spLocks noGrp="1"/>
-          </p:cNvSpPr>
-          <p:nvPr>
-            <p:ph type="sldNum" sz="quarter" idx="5"/>
-          </p:nvPr>
-        </p:nvSpPr>
-        <p:spPr>
-          <a:xfrm>
-            <a:off x="3884613" y="8685213"/>
-            <a:ext cx="2971800" cy="458787"/>
-          </a:xfrm>
-          <a:prstGeom prst="rect">
-            <a:avLst/>
-          </a:prstGeom>
-        </p:spPr>
-        <p:txBody>
-          <a:bodyPr vert="horz" lIns="91440" tIns="45720" rIns="91440" bIns="45720" rtlCol="0" anchor="b"/>
-          <a:lstStyle>
-            <a:lvl1pPr algn="r">
-              <a:defRPr sz="1200"/>
-            </a:lvl1pPr>
-          </a:lstStyle>
-          <a:p>
-            <a:fld id="{CE5E9CC1-C706-0F49-92D6-E571CC5EEA8F}" type="slidenum">
-              <a:rPr lang="en-US"/>
-              <a:t>‹#›</a:t>
-            </a:fld>
-            <a:endParaRPr lang="en-US"/>
-          </a:p>
-        </p:txBody>
-      </p:sp>
     </p:spTree>
     <p:extLst>
       <p:ext uri="{BB962C8B-B14F-4D97-AF65-F5344CB8AC3E}">
-        <p14:creationId xmlns:p14="http://schemas.microsoft.com/office/powerpoint/2010/main" val="1024086991"/>
+        <p14:creationId xmlns:p14="http://schemas.microsoft.com/office/powerpoint/2010/main" val="3492886208"/>
       </p:ext>
     </p:extLst>
   </p:cSld>
@@ -506,10 +287,6 @@
           <a:bodyPr/>
           <a:lstStyle/>
           <a:p>
-            <a:r>
-              <a:rPr lang="en-US" dirty="0"/>
-              <a:t/>
-            </a:r>
             <a:endParaRPr lang="en-US" dirty="0"/>
           </a:p>
         </p:txBody>
@@ -598,7 +375,6 @@
               <a:rPr lang="en-US" dirty="0"/>
               <a:t>Sets context: Constitution establishes rules; Specify creates the feature spec that follows those rules.</a:t>
             </a:r>
-            <a:endParaRPr lang="en-US" dirty="0"/>
           </a:p>
         </p:txBody>
       </p:sp>
@@ -686,7 +462,6 @@
               <a:rPr lang="en-US" dirty="0"/>
               <a:t>Emphasize the tradeoff: large specs risk model drift; tiny specs can make Spec Kit feel like overkill.</a:t>
             </a:r>
-            <a:endParaRPr lang="en-US" dirty="0"/>
           </a:p>
         </p:txBody>
       </p:sp>
@@ -774,7 +549,6 @@
               <a:rPr lang="en-US" dirty="0"/>
               <a:t>Reinforce: focus on UX and requirements—not how you’ll build it.</a:t>
             </a:r>
-            <a:endParaRPr lang="en-US" dirty="0"/>
           </a:p>
         </p:txBody>
       </p:sp>
@@ -862,7 +636,6 @@
               <a:rPr lang="en-US" dirty="0"/>
               <a:t>Connect the chat command to the repo operations and templated structure.</a:t>
             </a:r>
-            <a:endParaRPr lang="en-US" dirty="0"/>
           </a:p>
         </p:txBody>
       </p:sp>
@@ -950,7 +723,6 @@
               <a:rPr lang="en-US" dirty="0"/>
               <a:t>Call out the practical naming tip and why it matters (clean branches, predictable folders).</a:t>
             </a:r>
-            <a:endParaRPr lang="en-US" dirty="0"/>
           </a:p>
         </p:txBody>
       </p:sp>
@@ -1038,7 +810,6 @@
               <a:rPr lang="en-US" dirty="0"/>
               <a:t>Position the spec as the foundation for later planning/implementation, and tee up Clarify as the cleanup pass.</a:t>
             </a:r>
-            <a:endParaRPr lang="en-US" dirty="0"/>
           </a:p>
         </p:txBody>
       </p:sp>
@@ -1111,6 +882,11 @@
 <file path=ppt/slideMasters/slideMaster1.xml><?xml version="1.0" encoding="utf-8"?>
 <p:sldMaster xmlns:a="http://schemas.openxmlformats.org/drawingml/2006/main" xmlns:r="http://schemas.openxmlformats.org/officeDocument/2006/relationships" xmlns:p="http://schemas.openxmlformats.org/presentationml/2006/main">
   <p:cSld>
+    <p:bg>
+      <p:bgRef idx="1001">
+        <a:schemeClr val="bg1"/>
+      </p:bgRef>
+    </p:bg>
     <p:spTree>
       <p:nvGrpSpPr>
         <p:cNvPr id="1" name=""/>
@@ -1404,14 +1180,14 @@
       </p:grpSpPr>
       <p:pic>
         <p:nvPicPr>
-          <p:cNvPr id="2" name="Image 0" descr="/mnt/data/ai_bg_extracted.png">    </p:cNvPr>
+          <p:cNvPr id="2" name="Image 0" descr="/mnt/data/ai_bg_extracted.png"/>
           <p:cNvPicPr>
             <a:picLocks noChangeAspect="1"/>
           </p:cNvPicPr>
           <p:nvPr/>
         </p:nvPicPr>
         <p:blipFill>
-          <a:blip r:embed="rId1"/>
+          <a:blip r:embed="rId3"/>
           <a:stretch>
             <a:fillRect/>
           </a:stretch>
@@ -1454,6 +1230,13 @@
             <a:prstDash val="solid"/>
           </a:ln>
         </p:spPr>
+        <p:txBody>
+          <a:bodyPr/>
+          <a:lstStyle/>
+          <a:p>
+            <a:endParaRPr lang="en-US"/>
+          </a:p>
+        </p:txBody>
       </p:sp>
       <p:sp>
         <p:nvSpPr>
@@ -1483,6 +1266,13 @@
             <a:prstDash val="solid"/>
           </a:ln>
         </p:spPr>
+        <p:txBody>
+          <a:bodyPr/>
+          <a:lstStyle/>
+          <a:p>
+            <a:endParaRPr lang="en-US"/>
+          </a:p>
+        </p:txBody>
       </p:sp>
       <p:sp>
         <p:nvSpPr>
@@ -1505,7 +1295,7 @@
           <a:bodyPr wrap="square" rtlCol="0" anchor="ctr"/>
           <a:lstStyle/>
           <a:p>
-            <a:pPr indent="0" marL="0">
+            <a:pPr marL="0" indent="0">
               <a:buNone/>
             </a:pPr>
             <a:r>
@@ -1544,7 +1334,7 @@
           <a:bodyPr wrap="square" rtlCol="0" anchor="ctr"/>
           <a:lstStyle/>
           <a:p>
-            <a:pPr indent="0" marL="0">
+            <a:pPr marL="0" indent="0">
               <a:buNone/>
             </a:pPr>
             <a:r>
@@ -1588,6 +1378,13 @@
             <a:prstDash val="solid"/>
           </a:ln>
         </p:spPr>
+        <p:txBody>
+          <a:bodyPr/>
+          <a:lstStyle/>
+          <a:p>
+            <a:endParaRPr lang="en-US"/>
+          </a:p>
+        </p:txBody>
       </p:sp>
       <p:sp>
         <p:nvSpPr>
@@ -1610,7 +1407,7 @@
           <a:bodyPr wrap="square" rtlCol="0" anchor="ctr"/>
           <a:lstStyle/>
           <a:p>
-            <a:pPr indent="0" marL="0">
+            <a:pPr marL="0" indent="0">
               <a:buNone/>
             </a:pPr>
             <a:r>
@@ -1649,7 +1446,7 @@
           <a:bodyPr wrap="square" rtlCol="0" anchor="ctr"/>
           <a:lstStyle/>
           <a:p>
-            <a:pPr indent="0" marL="0">
+            <a:pPr marL="0" indent="0">
               <a:lnSpc>
                 <a:spcPct val="112000"/>
               </a:lnSpc>
@@ -1669,7 +1466,7 @@
             <a:endParaRPr lang="en-US" sz="1800" dirty="0"/>
           </a:p>
           <a:p>
-            <a:pPr indent="0" marL="0">
+            <a:pPr marL="0" indent="0">
               <a:lnSpc>
                 <a:spcPct val="112000"/>
               </a:lnSpc>
@@ -1689,7 +1486,7 @@
             <a:endParaRPr lang="en-US" sz="1800" dirty="0"/>
           </a:p>
           <a:p>
-            <a:pPr indent="0" marL="0">
+            <a:pPr marL="0" indent="0">
               <a:lnSpc>
                 <a:spcPct val="112000"/>
               </a:lnSpc>
@@ -1709,7 +1506,7 @@
             <a:endParaRPr lang="en-US" sz="1800" dirty="0"/>
           </a:p>
           <a:p>
-            <a:pPr indent="0" marL="0">
+            <a:pPr marL="0" indent="0">
               <a:lnSpc>
                 <a:spcPct val="112000"/>
               </a:lnSpc>
@@ -1729,7 +1526,7 @@
             <a:endParaRPr lang="en-US" sz="1800" dirty="0"/>
           </a:p>
           <a:p>
-            <a:pPr indent="0" marL="0">
+            <a:pPr marL="0" indent="0">
               <a:lnSpc>
                 <a:spcPct val="112000"/>
               </a:lnSpc>
@@ -1749,7 +1546,7 @@
             <a:endParaRPr lang="en-US" sz="1800" dirty="0"/>
           </a:p>
           <a:p>
-            <a:pPr indent="0" marL="0">
+            <a:pPr marL="0" indent="0">
               <a:lnSpc>
                 <a:spcPct val="112000"/>
               </a:lnSpc>
@@ -1772,14 +1569,14 @@
       </p:sp>
       <p:pic>
         <p:nvPicPr>
-          <p:cNvPr id="10" name="Image 1" descr="/mnt/data/Code-with-image.png">    </p:cNvPr>
+          <p:cNvPr id="10" name="Image 1" descr="/mnt/data/Code-with-image.png"/>
           <p:cNvPicPr>
             <a:picLocks noChangeAspect="1"/>
           </p:cNvPicPr>
           <p:nvPr/>
         </p:nvPicPr>
         <p:blipFill>
-          <a:blip r:embed="rId2"/>
+          <a:blip r:embed="rId4"/>
           <a:stretch>
             <a:fillRect/>
           </a:stretch>
@@ -1815,7 +1612,7 @@
           <a:bodyPr wrap="square" rtlCol="0" anchor="ctr"/>
           <a:lstStyle/>
           <a:p>
-            <a:pPr indent="0" marL="0">
+            <a:pPr marL="0" indent="0">
               <a:buNone/>
             </a:pPr>
             <a:r>
@@ -1854,7 +1651,7 @@
           <a:bodyPr wrap="square" rtlCol="0" anchor="ctr"/>
           <a:lstStyle/>
           <a:p>
-            <a:pPr algn="ctr" indent="0" marL="0">
+            <a:pPr marL="0" indent="0" algn="ctr">
               <a:buNone/>
             </a:pPr>
             <a:r>
@@ -1899,14 +1696,14 @@
       </p:grpSpPr>
       <p:pic>
         <p:nvPicPr>
-          <p:cNvPr id="2" name="Image 0" descr="/mnt/data/ai_bg_extracted.png">    </p:cNvPr>
+          <p:cNvPr id="2" name="Image 0" descr="/mnt/data/ai_bg_extracted.png"/>
           <p:cNvPicPr>
             <a:picLocks noChangeAspect="1"/>
           </p:cNvPicPr>
           <p:nvPr/>
         </p:nvPicPr>
         <p:blipFill>
-          <a:blip r:embed="rId1"/>
+          <a:blip r:embed="rId3"/>
           <a:stretch>
             <a:fillRect/>
           </a:stretch>
@@ -1949,35 +1746,13 @@
             <a:prstDash val="solid"/>
           </a:ln>
         </p:spPr>
-      </p:sp>
-      <p:sp>
-        <p:nvSpPr>
-          <p:cNvPr id="4" name="Shape 1"/>
-          <p:cNvSpPr/>
-          <p:nvPr/>
-        </p:nvSpPr>
-        <p:spPr>
-          <a:xfrm>
-            <a:off x="640080" y="320040"/>
-            <a:ext cx="10908792" cy="868680"/>
-          </a:xfrm>
-          <a:prstGeom prst="rect">
-            <a:avLst/>
-          </a:prstGeom>
-          <a:solidFill>
-            <a:srgbClr val="0A0F24">
-              <a:alpha val="65000"/>
-            </a:srgbClr>
-          </a:solidFill>
-          <a:ln w="12700">
-            <a:solidFill>
-              <a:srgbClr val="00E5FF">
-                <a:alpha val="30000"/>
-              </a:srgbClr>
-            </a:solidFill>
-            <a:prstDash val="solid"/>
-          </a:ln>
-        </p:spPr>
+        <p:txBody>
+          <a:bodyPr/>
+          <a:lstStyle/>
+          <a:p>
+            <a:endParaRPr lang="en-US"/>
+          </a:p>
+        </p:txBody>
       </p:sp>
       <p:sp>
         <p:nvSpPr>
@@ -2000,11 +1775,11 @@
           <a:bodyPr wrap="square" rtlCol="0" anchor="ctr"/>
           <a:lstStyle/>
           <a:p>
-            <a:pPr indent="0" marL="0">
-              <a:buNone/>
-            </a:pPr>
-            <a:r>
-              <a:rPr lang="en-US" sz="2000" b="1" dirty="0">
+            <a:pPr marL="0" indent="0">
+              <a:buNone/>
+            </a:pPr>
+            <a:r>
+              <a:rPr lang="en-US" sz="2400" b="1" dirty="0">
                 <a:solidFill>
                   <a:srgbClr val="FFFFFF"/>
                 </a:solidFill>
@@ -2014,7 +1789,7 @@
               </a:rPr>
               <a:t>From “Constitution” to a New Spec (Workflow Context)</a:t>
             </a:r>
-            <a:endParaRPr lang="en-US" sz="2000" dirty="0"/>
+            <a:endParaRPr lang="en-US" sz="2400" dirty="0"/>
           </a:p>
         </p:txBody>
       </p:sp>
@@ -2046,6 +1821,15 @@
             <a:prstDash val="solid"/>
           </a:ln>
         </p:spPr>
+        <p:txBody>
+          <a:bodyPr/>
+          <a:lstStyle/>
+          <a:p>
+            <a:endParaRPr lang="en-US" dirty="0">
+              <a:latin typeface="Aptos" panose="020B0004020202020204" pitchFamily="34" charset="0"/>
+            </a:endParaRPr>
+          </a:p>
+        </p:txBody>
       </p:sp>
       <p:sp>
         <p:nvSpPr>
@@ -2068,7 +1852,7 @@
           <a:bodyPr wrap="square" rtlCol="0" anchor="t"/>
           <a:lstStyle/>
           <a:p>
-            <a:pPr indent="0" marL="0">
+            <a:pPr marL="0" indent="0">
               <a:lnSpc>
                 <a:spcPct val="115000"/>
               </a:lnSpc>
@@ -2088,7 +1872,7 @@
             <a:endParaRPr lang="en-US" sz="2000" dirty="0"/>
           </a:p>
           <a:p>
-            <a:pPr indent="0" marL="0">
+            <a:pPr marL="0" indent="0">
               <a:lnSpc>
                 <a:spcPct val="115000"/>
               </a:lnSpc>
@@ -2103,12 +1887,23 @@
                 <a:ea typeface="Aptos" pitchFamily="34" charset="-122"/>
                 <a:cs typeface="Aptos" pitchFamily="34" charset="-120"/>
               </a:rPr>
-              <a:t>• Next step: create a new high-level spec using /Specify</a:t>
+              <a:t>• Next step: create a new high-level spec </a:t>
+            </a:r>
+            <a:r>
+              <a:rPr lang="en-US" sz="2000">
+                <a:solidFill>
+                  <a:srgbClr val="D7DAE5"/>
+                </a:solidFill>
+                <a:latin typeface="Aptos" pitchFamily="34" charset="0"/>
+                <a:ea typeface="Aptos" pitchFamily="34" charset="-122"/>
+                <a:cs typeface="Aptos" pitchFamily="34" charset="-120"/>
+              </a:rPr>
+              <a:t>using /specify</a:t>
             </a:r>
             <a:endParaRPr lang="en-US" sz="2000" dirty="0"/>
           </a:p>
           <a:p>
-            <a:pPr indent="0" marL="0">
+            <a:pPr marL="0" indent="0">
               <a:lnSpc>
                 <a:spcPct val="115000"/>
               </a:lnSpc>
@@ -2157,6 +1952,13 @@
             <a:prstDash val="solid"/>
           </a:ln>
         </p:spPr>
+        <p:txBody>
+          <a:bodyPr/>
+          <a:lstStyle/>
+          <a:p>
+            <a:endParaRPr lang="en-US"/>
+          </a:p>
+        </p:txBody>
       </p:sp>
       <p:sp>
         <p:nvSpPr>
@@ -2179,7 +1981,7 @@
           <a:bodyPr wrap="square" rtlCol="0" anchor="ctr"/>
           <a:lstStyle/>
           <a:p>
-            <a:pPr indent="0" marL="0">
+            <a:pPr marL="0" indent="0">
               <a:buNone/>
             </a:pPr>
             <a:r>
@@ -2199,14 +2001,14 @@
       </p:sp>
       <p:pic>
         <p:nvPicPr>
-          <p:cNvPr id="10" name="Image 1" descr="/mnt/data/Code-with-image.png">    </p:cNvPr>
+          <p:cNvPr id="10" name="Image 1" descr="/mnt/data/Code-with-image.png"/>
           <p:cNvPicPr>
             <a:picLocks noChangeAspect="1"/>
           </p:cNvPicPr>
           <p:nvPr/>
         </p:nvPicPr>
         <p:blipFill>
-          <a:blip r:embed="rId2"/>
+          <a:blip r:embed="rId4"/>
           <a:stretch>
             <a:fillRect/>
           </a:stretch>
@@ -2242,7 +2044,7 @@
           <a:bodyPr wrap="square" rtlCol="0" anchor="ctr"/>
           <a:lstStyle/>
           <a:p>
-            <a:pPr indent="0" marL="0">
+            <a:pPr marL="0" indent="0">
               <a:buNone/>
             </a:pPr>
             <a:r>
@@ -2281,7 +2083,7 @@
           <a:bodyPr wrap="square" rtlCol="0" anchor="ctr"/>
           <a:lstStyle/>
           <a:p>
-            <a:pPr algn="ctr" indent="0" marL="0">
+            <a:pPr marL="0" indent="0" algn="ctr">
               <a:buNone/>
             </a:pPr>
             <a:r>
@@ -2326,14 +2128,14 @@
       </p:grpSpPr>
       <p:pic>
         <p:nvPicPr>
-          <p:cNvPr id="2" name="Image 0" descr="/mnt/data/ai_bg_extracted.png">    </p:cNvPr>
+          <p:cNvPr id="2" name="Image 0" descr="/mnt/data/ai_bg_extracted.png"/>
           <p:cNvPicPr>
             <a:picLocks noChangeAspect="1"/>
           </p:cNvPicPr>
           <p:nvPr/>
         </p:nvPicPr>
         <p:blipFill>
-          <a:blip r:embed="rId1"/>
+          <a:blip r:embed="rId3"/>
           <a:stretch>
             <a:fillRect/>
           </a:stretch>
@@ -2376,35 +2178,13 @@
             <a:prstDash val="solid"/>
           </a:ln>
         </p:spPr>
-      </p:sp>
-      <p:sp>
-        <p:nvSpPr>
-          <p:cNvPr id="4" name="Shape 1"/>
-          <p:cNvSpPr/>
-          <p:nvPr/>
-        </p:nvSpPr>
-        <p:spPr>
-          <a:xfrm>
-            <a:off x="640080" y="320040"/>
-            <a:ext cx="10908792" cy="868680"/>
-          </a:xfrm>
-          <a:prstGeom prst="rect">
-            <a:avLst/>
-          </a:prstGeom>
-          <a:solidFill>
-            <a:srgbClr val="0A0F24">
-              <a:alpha val="65000"/>
-            </a:srgbClr>
-          </a:solidFill>
-          <a:ln w="12700">
-            <a:solidFill>
-              <a:srgbClr val="00E5FF">
-                <a:alpha val="30000"/>
-              </a:srgbClr>
-            </a:solidFill>
-            <a:prstDash val="solid"/>
-          </a:ln>
-        </p:spPr>
+        <p:txBody>
+          <a:bodyPr/>
+          <a:lstStyle/>
+          <a:p>
+            <a:endParaRPr lang="en-US"/>
+          </a:p>
+        </p:txBody>
       </p:sp>
       <p:sp>
         <p:nvSpPr>
@@ -2427,11 +2207,11 @@
           <a:bodyPr wrap="square" rtlCol="0" anchor="ctr"/>
           <a:lstStyle/>
           <a:p>
-            <a:pPr indent="0" marL="0">
-              <a:buNone/>
-            </a:pPr>
-            <a:r>
-              <a:rPr lang="en-US" sz="2000" b="1" dirty="0">
+            <a:pPr marL="0" indent="0">
+              <a:buNone/>
+            </a:pPr>
+            <a:r>
+              <a:rPr lang="en-US" sz="2400" b="1" dirty="0">
                 <a:solidFill>
                   <a:srgbClr val="FFFFFF"/>
                 </a:solidFill>
@@ -2441,7 +2221,7 @@
               </a:rPr>
               <a:t>When to Use /Specify (Scope + Best Practices)</a:t>
             </a:r>
-            <a:endParaRPr lang="en-US" sz="2000" dirty="0"/>
+            <a:endParaRPr lang="en-US" sz="2400" dirty="0"/>
           </a:p>
         </p:txBody>
       </p:sp>
@@ -2473,6 +2253,13 @@
             <a:prstDash val="solid"/>
           </a:ln>
         </p:spPr>
+        <p:txBody>
+          <a:bodyPr/>
+          <a:lstStyle/>
+          <a:p>
+            <a:endParaRPr lang="en-US"/>
+          </a:p>
+        </p:txBody>
       </p:sp>
       <p:sp>
         <p:nvSpPr>
@@ -2495,7 +2282,7 @@
           <a:bodyPr wrap="square" rtlCol="0" anchor="t"/>
           <a:lstStyle/>
           <a:p>
-            <a:pPr indent="0" marL="0">
+            <a:pPr marL="0" indent="0">
               <a:lnSpc>
                 <a:spcPct val="115000"/>
               </a:lnSpc>
@@ -2515,7 +2302,7 @@
             <a:endParaRPr lang="en-US" sz="1900" dirty="0"/>
           </a:p>
           <a:p>
-            <a:pPr indent="0" marL="0">
+            <a:pPr marL="0" indent="0">
               <a:lnSpc>
                 <a:spcPct val="115000"/>
               </a:lnSpc>
@@ -2535,7 +2322,7 @@
             <a:endParaRPr lang="en-US" sz="1900" dirty="0"/>
           </a:p>
           <a:p>
-            <a:pPr indent="0" marL="0">
+            <a:pPr marL="0" indent="0">
               <a:lnSpc>
                 <a:spcPct val="115000"/>
               </a:lnSpc>
@@ -2555,7 +2342,7 @@
             <a:endParaRPr lang="en-US" sz="1900" dirty="0"/>
           </a:p>
           <a:p>
-            <a:pPr indent="0" marL="0">
+            <a:pPr marL="0" indent="0">
               <a:lnSpc>
                 <a:spcPct val="115000"/>
               </a:lnSpc>
@@ -2575,7 +2362,7 @@
             <a:endParaRPr lang="en-US" sz="1900" dirty="0"/>
           </a:p>
           <a:p>
-            <a:pPr indent="0" marL="0">
+            <a:pPr marL="0" indent="0">
               <a:lnSpc>
                 <a:spcPct val="115000"/>
               </a:lnSpc>
@@ -2595,7 +2382,7 @@
             <a:endParaRPr lang="en-US" sz="1900" dirty="0"/>
           </a:p>
           <a:p>
-            <a:pPr indent="0" marL="0">
+            <a:pPr marL="0" indent="0">
               <a:lnSpc>
                 <a:spcPct val="115000"/>
               </a:lnSpc>
@@ -2615,7 +2402,7 @@
             <a:endParaRPr lang="en-US" sz="1900" dirty="0"/>
           </a:p>
           <a:p>
-            <a:pPr indent="0" marL="0">
+            <a:pPr marL="0" indent="0">
               <a:lnSpc>
                 <a:spcPct val="115000"/>
               </a:lnSpc>
@@ -2638,14 +2425,14 @@
       </p:sp>
       <p:pic>
         <p:nvPicPr>
-          <p:cNvPr id="8" name="Image 1" descr="/mnt/data/Code-with-image.png">    </p:cNvPr>
+          <p:cNvPr id="8" name="Image 1" descr="/mnt/data/Code-with-image.png"/>
           <p:cNvPicPr>
             <a:picLocks noChangeAspect="1"/>
           </p:cNvPicPr>
           <p:nvPr/>
         </p:nvPicPr>
         <p:blipFill>
-          <a:blip r:embed="rId2"/>
+          <a:blip r:embed="rId4"/>
           <a:stretch>
             <a:fillRect/>
           </a:stretch>
@@ -2681,7 +2468,7 @@
           <a:bodyPr wrap="square" rtlCol="0" anchor="ctr"/>
           <a:lstStyle/>
           <a:p>
-            <a:pPr indent="0" marL="0">
+            <a:pPr marL="0" indent="0">
               <a:buNone/>
             </a:pPr>
             <a:r>
@@ -2720,7 +2507,7 @@
           <a:bodyPr wrap="square" rtlCol="0" anchor="ctr"/>
           <a:lstStyle/>
           <a:p>
-            <a:pPr algn="ctr" indent="0" marL="0">
+            <a:pPr marL="0" indent="0" algn="ctr">
               <a:buNone/>
             </a:pPr>
             <a:r>
@@ -2765,14 +2552,14 @@
       </p:grpSpPr>
       <p:pic>
         <p:nvPicPr>
-          <p:cNvPr id="2" name="Image 0" descr="/mnt/data/ai_bg_extracted.png">    </p:cNvPr>
+          <p:cNvPr id="2" name="Image 0" descr="/mnt/data/ai_bg_extracted.png"/>
           <p:cNvPicPr>
             <a:picLocks noChangeAspect="1"/>
           </p:cNvPicPr>
           <p:nvPr/>
         </p:nvPicPr>
         <p:blipFill>
-          <a:blip r:embed="rId1"/>
+          <a:blip r:embed="rId3"/>
           <a:stretch>
             <a:fillRect/>
           </a:stretch>
@@ -2815,6 +2602,13 @@
             <a:prstDash val="solid"/>
           </a:ln>
         </p:spPr>
+        <p:txBody>
+          <a:bodyPr/>
+          <a:lstStyle/>
+          <a:p>
+            <a:endParaRPr lang="en-US"/>
+          </a:p>
+        </p:txBody>
       </p:sp>
       <p:sp>
         <p:nvSpPr>
@@ -2844,6 +2638,13 @@
             <a:prstDash val="solid"/>
           </a:ln>
         </p:spPr>
+        <p:txBody>
+          <a:bodyPr/>
+          <a:lstStyle/>
+          <a:p>
+            <a:endParaRPr lang="en-US"/>
+          </a:p>
+        </p:txBody>
       </p:sp>
       <p:sp>
         <p:nvSpPr>
@@ -2866,7 +2667,7 @@
           <a:bodyPr wrap="square" rtlCol="0" anchor="ctr"/>
           <a:lstStyle/>
           <a:p>
-            <a:pPr indent="0" marL="0">
+            <a:pPr marL="0" indent="0">
               <a:buNone/>
             </a:pPr>
             <a:r>
@@ -2912,6 +2713,15 @@
             <a:prstDash val="solid"/>
           </a:ln>
         </p:spPr>
+        <p:txBody>
+          <a:bodyPr/>
+          <a:lstStyle/>
+          <a:p>
+            <a:endParaRPr lang="en-US" dirty="0">
+              <a:latin typeface="Aptos" panose="020B0004020202020204" pitchFamily="34" charset="0"/>
+            </a:endParaRPr>
+          </a:p>
+        </p:txBody>
       </p:sp>
       <p:sp>
         <p:nvSpPr>
@@ -2934,7 +2744,7 @@
           <a:bodyPr wrap="square" rtlCol="0" anchor="t"/>
           <a:lstStyle/>
           <a:p>
-            <a:pPr indent="0" marL="0">
+            <a:pPr marL="0" indent="0">
               <a:lnSpc>
                 <a:spcPct val="115000"/>
               </a:lnSpc>
@@ -2954,7 +2764,7 @@
             <a:endParaRPr lang="en-US" sz="1900" dirty="0"/>
           </a:p>
           <a:p>
-            <a:pPr indent="0" marL="0">
+            <a:pPr marL="0" indent="0">
               <a:lnSpc>
                 <a:spcPct val="115000"/>
               </a:lnSpc>
@@ -2974,7 +2784,7 @@
             <a:endParaRPr lang="en-US" sz="1900" dirty="0"/>
           </a:p>
           <a:p>
-            <a:pPr indent="0" marL="0">
+            <a:pPr marL="0" indent="0">
               <a:lnSpc>
                 <a:spcPct val="115000"/>
               </a:lnSpc>
@@ -2994,7 +2804,7 @@
             <a:endParaRPr lang="en-US" sz="1900" dirty="0"/>
           </a:p>
           <a:p>
-            <a:pPr indent="0" marL="0">
+            <a:pPr marL="0" indent="0">
               <a:lnSpc>
                 <a:spcPct val="115000"/>
               </a:lnSpc>
@@ -3014,7 +2824,7 @@
             <a:endParaRPr lang="en-US" sz="1900" dirty="0"/>
           </a:p>
           <a:p>
-            <a:pPr indent="0" marL="0">
+            <a:pPr marL="0" indent="0">
               <a:lnSpc>
                 <a:spcPct val="115000"/>
               </a:lnSpc>
@@ -3034,7 +2844,7 @@
             <a:endParaRPr lang="en-US" sz="1900" dirty="0"/>
           </a:p>
           <a:p>
-            <a:pPr indent="0" marL="0">
+            <a:pPr marL="0" indent="0">
               <a:lnSpc>
                 <a:spcPct val="115000"/>
               </a:lnSpc>
@@ -3054,7 +2864,7 @@
             <a:endParaRPr lang="en-US" sz="1900" dirty="0"/>
           </a:p>
           <a:p>
-            <a:pPr indent="0" marL="0">
+            <a:pPr marL="0" indent="0">
               <a:lnSpc>
                 <a:spcPct val="115000"/>
               </a:lnSpc>
@@ -3103,6 +2913,13 @@
             <a:prstDash val="solid"/>
           </a:ln>
         </p:spPr>
+        <p:txBody>
+          <a:bodyPr/>
+          <a:lstStyle/>
+          <a:p>
+            <a:endParaRPr lang="en-US"/>
+          </a:p>
+        </p:txBody>
       </p:sp>
       <p:sp>
         <p:nvSpPr>
@@ -3125,7 +2942,7 @@
           <a:bodyPr wrap="square" rtlCol="0" anchor="ctr"/>
           <a:lstStyle/>
           <a:p>
-            <a:pPr indent="0" marL="0">
+            <a:pPr marL="0" indent="0">
               <a:buNone/>
             </a:pPr>
             <a:r>
@@ -3142,7 +2959,7 @@
             <a:endParaRPr lang="en-US" sz="1200" dirty="0"/>
           </a:p>
           <a:p>
-            <a:pPr indent="0" marL="0">
+            <a:pPr marL="0" indent="0">
               <a:buNone/>
             </a:pPr>
             <a:r>
@@ -3159,7 +2976,7 @@
             <a:endParaRPr lang="en-US" sz="1200" dirty="0"/>
           </a:p>
           <a:p>
-            <a:pPr indent="0" marL="0">
+            <a:pPr marL="0" indent="0">
               <a:buNone/>
             </a:pPr>
             <a:r>
@@ -3176,7 +2993,7 @@
             <a:endParaRPr lang="en-US" sz="1200" dirty="0"/>
           </a:p>
           <a:p>
-            <a:pPr indent="0" marL="0">
+            <a:pPr marL="0" indent="0">
               <a:buNone/>
             </a:pPr>
             <a:r>
@@ -3193,7 +3010,7 @@
             <a:endParaRPr lang="en-US" sz="1200" dirty="0"/>
           </a:p>
           <a:p>
-            <a:pPr indent="0" marL="0">
+            <a:pPr marL="0" indent="0">
               <a:buNone/>
             </a:pPr>
             <a:r>
@@ -3213,14 +3030,14 @@
       </p:sp>
       <p:pic>
         <p:nvPicPr>
-          <p:cNvPr id="10" name="Image 1" descr="/mnt/data/Code-with-image.png">    </p:cNvPr>
+          <p:cNvPr id="10" name="Image 1" descr="/mnt/data/Code-with-image.png"/>
           <p:cNvPicPr>
             <a:picLocks noChangeAspect="1"/>
           </p:cNvPicPr>
           <p:nvPr/>
         </p:nvPicPr>
         <p:blipFill>
-          <a:blip r:embed="rId2"/>
+          <a:blip r:embed="rId4"/>
           <a:stretch>
             <a:fillRect/>
           </a:stretch>
@@ -3256,7 +3073,7 @@
           <a:bodyPr wrap="square" rtlCol="0" anchor="ctr"/>
           <a:lstStyle/>
           <a:p>
-            <a:pPr indent="0" marL="0">
+            <a:pPr marL="0" indent="0">
               <a:buNone/>
             </a:pPr>
             <a:r>
@@ -3295,7 +3112,7 @@
           <a:bodyPr wrap="square" rtlCol="0" anchor="ctr"/>
           <a:lstStyle/>
           <a:p>
-            <a:pPr algn="ctr" indent="0" marL="0">
+            <a:pPr marL="0" indent="0" algn="ctr">
               <a:buNone/>
             </a:pPr>
             <a:r>
@@ -3340,14 +3157,14 @@
       </p:grpSpPr>
       <p:pic>
         <p:nvPicPr>
-          <p:cNvPr id="2" name="Image 0" descr="/mnt/data/ai_bg_extracted.png">    </p:cNvPr>
+          <p:cNvPr id="2" name="Image 0" descr="/mnt/data/ai_bg_extracted.png"/>
           <p:cNvPicPr>
             <a:picLocks noChangeAspect="1"/>
           </p:cNvPicPr>
           <p:nvPr/>
         </p:nvPicPr>
         <p:blipFill>
-          <a:blip r:embed="rId1"/>
+          <a:blip r:embed="rId3"/>
           <a:stretch>
             <a:fillRect/>
           </a:stretch>
@@ -3390,6 +3207,13 @@
             <a:prstDash val="solid"/>
           </a:ln>
         </p:spPr>
+        <p:txBody>
+          <a:bodyPr/>
+          <a:lstStyle/>
+          <a:p>
+            <a:endParaRPr lang="en-US"/>
+          </a:p>
+        </p:txBody>
       </p:sp>
       <p:sp>
         <p:nvSpPr>
@@ -3419,6 +3243,13 @@
             <a:prstDash val="solid"/>
           </a:ln>
         </p:spPr>
+        <p:txBody>
+          <a:bodyPr/>
+          <a:lstStyle/>
+          <a:p>
+            <a:endParaRPr lang="en-US"/>
+          </a:p>
+        </p:txBody>
       </p:sp>
       <p:sp>
         <p:nvSpPr>
@@ -3441,7 +3272,7 @@
           <a:bodyPr wrap="square" rtlCol="0" anchor="ctr"/>
           <a:lstStyle/>
           <a:p>
-            <a:pPr indent="0" marL="0">
+            <a:pPr marL="0" indent="0">
               <a:buNone/>
             </a:pPr>
             <a:r>
@@ -3487,6 +3318,13 @@
             <a:prstDash val="solid"/>
           </a:ln>
         </p:spPr>
+        <p:txBody>
+          <a:bodyPr/>
+          <a:lstStyle/>
+          <a:p>
+            <a:endParaRPr lang="en-US"/>
+          </a:p>
+        </p:txBody>
       </p:sp>
       <p:sp>
         <p:nvSpPr>
@@ -3509,7 +3347,7 @@
           <a:bodyPr wrap="square" rtlCol="0" anchor="t"/>
           <a:lstStyle/>
           <a:p>
-            <a:pPr indent="0" marL="0">
+            <a:pPr marL="0" indent="0">
               <a:lnSpc>
                 <a:spcPct val="115000"/>
               </a:lnSpc>
@@ -3529,7 +3367,7 @@
             <a:endParaRPr lang="en-US" sz="2000" dirty="0"/>
           </a:p>
           <a:p>
-            <a:pPr indent="0" marL="0">
+            <a:pPr marL="0" indent="0">
               <a:lnSpc>
                 <a:spcPct val="115000"/>
               </a:lnSpc>
@@ -3549,7 +3387,7 @@
             <a:endParaRPr lang="en-US" sz="2000" dirty="0"/>
           </a:p>
           <a:p>
-            <a:pPr indent="0" marL="0">
+            <a:pPr marL="0" indent="0">
               <a:lnSpc>
                 <a:spcPct val="115000"/>
               </a:lnSpc>
@@ -3569,7 +3407,7 @@
             <a:endParaRPr lang="en-US" sz="2000" dirty="0"/>
           </a:p>
           <a:p>
-            <a:pPr indent="0" marL="0">
+            <a:pPr marL="0" indent="0">
               <a:lnSpc>
                 <a:spcPct val="115000"/>
               </a:lnSpc>
@@ -3589,7 +3427,7 @@
             <a:endParaRPr lang="en-US" sz="2000" dirty="0"/>
           </a:p>
           <a:p>
-            <a:pPr indent="0" marL="0">
+            <a:pPr marL="0" indent="0">
               <a:lnSpc>
                 <a:spcPct val="115000"/>
               </a:lnSpc>
@@ -3609,7 +3447,7 @@
             <a:endParaRPr lang="en-US" sz="2000" dirty="0"/>
           </a:p>
           <a:p>
-            <a:pPr indent="0" marL="0">
+            <a:pPr marL="0" indent="0">
               <a:lnSpc>
                 <a:spcPct val="115000"/>
               </a:lnSpc>
@@ -3658,6 +3496,13 @@
             <a:prstDash val="solid"/>
           </a:ln>
         </p:spPr>
+        <p:txBody>
+          <a:bodyPr/>
+          <a:lstStyle/>
+          <a:p>
+            <a:endParaRPr lang="en-US"/>
+          </a:p>
+        </p:txBody>
       </p:sp>
       <p:sp>
         <p:nvSpPr>
@@ -3680,7 +3525,7 @@
           <a:bodyPr wrap="square" rtlCol="0" anchor="ctr"/>
           <a:lstStyle/>
           <a:p>
-            <a:pPr indent="0" marL="0">
+            <a:pPr marL="0" indent="0">
               <a:buNone/>
             </a:pPr>
             <a:r>
@@ -3700,14 +3545,14 @@
       </p:sp>
       <p:pic>
         <p:nvPicPr>
-          <p:cNvPr id="10" name="Image 1" descr="/mnt/data/Code-with-image.png">    </p:cNvPr>
+          <p:cNvPr id="10" name="Image 1" descr="/mnt/data/Code-with-image.png"/>
           <p:cNvPicPr>
             <a:picLocks noChangeAspect="1"/>
           </p:cNvPicPr>
           <p:nvPr/>
         </p:nvPicPr>
         <p:blipFill>
-          <a:blip r:embed="rId2"/>
+          <a:blip r:embed="rId4"/>
           <a:stretch>
             <a:fillRect/>
           </a:stretch>
@@ -3743,7 +3588,7 @@
           <a:bodyPr wrap="square" rtlCol="0" anchor="ctr"/>
           <a:lstStyle/>
           <a:p>
-            <a:pPr indent="0" marL="0">
+            <a:pPr marL="0" indent="0">
               <a:buNone/>
             </a:pPr>
             <a:r>
@@ -3782,7 +3627,7 @@
           <a:bodyPr wrap="square" rtlCol="0" anchor="ctr"/>
           <a:lstStyle/>
           <a:p>
-            <a:pPr algn="ctr" indent="0" marL="0">
+            <a:pPr marL="0" indent="0" algn="ctr">
               <a:buNone/>
             </a:pPr>
             <a:r>
@@ -3827,14 +3672,14 @@
       </p:grpSpPr>
       <p:pic>
         <p:nvPicPr>
-          <p:cNvPr id="2" name="Image 0" descr="/mnt/data/ai_bg_extracted.png">    </p:cNvPr>
+          <p:cNvPr id="2" name="Image 0" descr="/mnt/data/ai_bg_extracted.png"/>
           <p:cNvPicPr>
             <a:picLocks noChangeAspect="1"/>
           </p:cNvPicPr>
           <p:nvPr/>
         </p:nvPicPr>
         <p:blipFill>
-          <a:blip r:embed="rId1"/>
+          <a:blip r:embed="rId3"/>
           <a:stretch>
             <a:fillRect/>
           </a:stretch>
@@ -3877,6 +3722,13 @@
             <a:prstDash val="solid"/>
           </a:ln>
         </p:spPr>
+        <p:txBody>
+          <a:bodyPr/>
+          <a:lstStyle/>
+          <a:p>
+            <a:endParaRPr lang="en-US"/>
+          </a:p>
+        </p:txBody>
       </p:sp>
       <p:sp>
         <p:nvSpPr>
@@ -3906,6 +3758,13 @@
             <a:prstDash val="solid"/>
           </a:ln>
         </p:spPr>
+        <p:txBody>
+          <a:bodyPr/>
+          <a:lstStyle/>
+          <a:p>
+            <a:endParaRPr lang="en-US"/>
+          </a:p>
+        </p:txBody>
       </p:sp>
       <p:sp>
         <p:nvSpPr>
@@ -3928,7 +3787,7 @@
           <a:bodyPr wrap="square" rtlCol="0" anchor="ctr"/>
           <a:lstStyle/>
           <a:p>
-            <a:pPr indent="0" marL="0">
+            <a:pPr marL="0" indent="0">
               <a:buNone/>
             </a:pPr>
             <a:r>
@@ -3974,6 +3833,13 @@
             <a:prstDash val="solid"/>
           </a:ln>
         </p:spPr>
+        <p:txBody>
+          <a:bodyPr/>
+          <a:lstStyle/>
+          <a:p>
+            <a:endParaRPr lang="en-US"/>
+          </a:p>
+        </p:txBody>
       </p:sp>
       <p:sp>
         <p:nvSpPr>
@@ -3996,7 +3862,7 @@
           <a:bodyPr wrap="square" rtlCol="0" anchor="t"/>
           <a:lstStyle/>
           <a:p>
-            <a:pPr indent="0" marL="0">
+            <a:pPr marL="0" indent="0">
               <a:lnSpc>
                 <a:spcPct val="115000"/>
               </a:lnSpc>
@@ -4016,7 +3882,7 @@
             <a:endParaRPr lang="en-US" sz="1800" dirty="0"/>
           </a:p>
           <a:p>
-            <a:pPr indent="0" marL="0">
+            <a:pPr marL="0" indent="0">
               <a:lnSpc>
                 <a:spcPct val="115000"/>
               </a:lnSpc>
@@ -4036,7 +3902,7 @@
             <a:endParaRPr lang="en-US" sz="1800" dirty="0"/>
           </a:p>
           <a:p>
-            <a:pPr indent="0" marL="0">
+            <a:pPr marL="0" indent="0">
               <a:lnSpc>
                 <a:spcPct val="115000"/>
               </a:lnSpc>
@@ -4056,7 +3922,7 @@
             <a:endParaRPr lang="en-US" sz="1800" dirty="0"/>
           </a:p>
           <a:p>
-            <a:pPr indent="0" marL="0">
+            <a:pPr marL="0" indent="0">
               <a:lnSpc>
                 <a:spcPct val="115000"/>
               </a:lnSpc>
@@ -4076,7 +3942,7 @@
             <a:endParaRPr lang="en-US" sz="1800" dirty="0"/>
           </a:p>
           <a:p>
-            <a:pPr indent="0" marL="0">
+            <a:pPr marL="0" indent="0">
               <a:lnSpc>
                 <a:spcPct val="115000"/>
               </a:lnSpc>
@@ -4096,7 +3962,7 @@
             <a:endParaRPr lang="en-US" sz="1800" dirty="0"/>
           </a:p>
           <a:p>
-            <a:pPr indent="0" marL="0">
+            <a:pPr marL="0" indent="0">
               <a:lnSpc>
                 <a:spcPct val="115000"/>
               </a:lnSpc>
@@ -4116,7 +3982,7 @@
             <a:endParaRPr lang="en-US" sz="1800" dirty="0"/>
           </a:p>
           <a:p>
-            <a:pPr indent="0" marL="0">
+            <a:pPr marL="0" indent="0">
               <a:lnSpc>
                 <a:spcPct val="115000"/>
               </a:lnSpc>
@@ -4136,7 +4002,7 @@
             <a:endParaRPr lang="en-US" sz="1800" dirty="0"/>
           </a:p>
           <a:p>
-            <a:pPr indent="0" marL="0">
+            <a:pPr marL="0" indent="0">
               <a:lnSpc>
                 <a:spcPct val="115000"/>
               </a:lnSpc>
@@ -4185,6 +4051,13 @@
             <a:prstDash val="solid"/>
           </a:ln>
         </p:spPr>
+        <p:txBody>
+          <a:bodyPr/>
+          <a:lstStyle/>
+          <a:p>
+            <a:endParaRPr lang="en-US"/>
+          </a:p>
+        </p:txBody>
       </p:sp>
       <p:sp>
         <p:nvSpPr>
@@ -4207,7 +4080,7 @@
           <a:bodyPr wrap="square" rtlCol="0" anchor="ctr"/>
           <a:lstStyle/>
           <a:p>
-            <a:pPr indent="0" marL="0">
+            <a:pPr marL="0" indent="0">
               <a:buNone/>
             </a:pPr>
             <a:r>
@@ -4227,14 +4100,14 @@
       </p:sp>
       <p:pic>
         <p:nvPicPr>
-          <p:cNvPr id="10" name="Image 1" descr="/mnt/data/Code-with-image.png">    </p:cNvPr>
+          <p:cNvPr id="10" name="Image 1" descr="/mnt/data/Code-with-image.png"/>
           <p:cNvPicPr>
             <a:picLocks noChangeAspect="1"/>
           </p:cNvPicPr>
           <p:nvPr/>
         </p:nvPicPr>
         <p:blipFill>
-          <a:blip r:embed="rId2"/>
+          <a:blip r:embed="rId4"/>
           <a:stretch>
             <a:fillRect/>
           </a:stretch>
@@ -4270,7 +4143,7 @@
           <a:bodyPr wrap="square" rtlCol="0" anchor="ctr"/>
           <a:lstStyle/>
           <a:p>
-            <a:pPr indent="0" marL="0">
+            <a:pPr marL="0" indent="0">
               <a:buNone/>
             </a:pPr>
             <a:r>
@@ -4309,7 +4182,7 @@
           <a:bodyPr wrap="square" rtlCol="0" anchor="ctr"/>
           <a:lstStyle/>
           <a:p>
-            <a:pPr algn="ctr" indent="0" marL="0">
+            <a:pPr marL="0" indent="0" algn="ctr">
               <a:buNone/>
             </a:pPr>
             <a:r>
@@ -4354,14 +4227,14 @@
       </p:grpSpPr>
       <p:pic>
         <p:nvPicPr>
-          <p:cNvPr id="2" name="Image 0" descr="/mnt/data/ai_bg_extracted.png">    </p:cNvPr>
+          <p:cNvPr id="2" name="Image 0" descr="/mnt/data/ai_bg_extracted.png"/>
           <p:cNvPicPr>
             <a:picLocks noChangeAspect="1"/>
           </p:cNvPicPr>
           <p:nvPr/>
         </p:nvPicPr>
         <p:blipFill>
-          <a:blip r:embed="rId1"/>
+          <a:blip r:embed="rId3"/>
           <a:stretch>
             <a:fillRect/>
           </a:stretch>
@@ -4404,6 +4277,13 @@
             <a:prstDash val="solid"/>
           </a:ln>
         </p:spPr>
+        <p:txBody>
+          <a:bodyPr/>
+          <a:lstStyle/>
+          <a:p>
+            <a:endParaRPr lang="en-US"/>
+          </a:p>
+        </p:txBody>
       </p:sp>
       <p:sp>
         <p:nvSpPr>
@@ -4433,6 +4313,13 @@
             <a:prstDash val="solid"/>
           </a:ln>
         </p:spPr>
+        <p:txBody>
+          <a:bodyPr/>
+          <a:lstStyle/>
+          <a:p>
+            <a:endParaRPr lang="en-US"/>
+          </a:p>
+        </p:txBody>
       </p:sp>
       <p:sp>
         <p:nvSpPr>
@@ -4455,7 +4342,7 @@
           <a:bodyPr wrap="square" rtlCol="0" anchor="ctr"/>
           <a:lstStyle/>
           <a:p>
-            <a:pPr indent="0" marL="0">
+            <a:pPr marL="0" indent="0">
               <a:buNone/>
             </a:pPr>
             <a:r>
@@ -4501,6 +4388,15 @@
             <a:prstDash val="solid"/>
           </a:ln>
         </p:spPr>
+        <p:txBody>
+          <a:bodyPr/>
+          <a:lstStyle/>
+          <a:p>
+            <a:endParaRPr lang="en-US" dirty="0">
+              <a:latin typeface="Aptos" panose="020B0004020202020204" pitchFamily="34" charset="0"/>
+            </a:endParaRPr>
+          </a:p>
+        </p:txBody>
       </p:sp>
       <p:sp>
         <p:nvSpPr>
@@ -4523,7 +4419,7 @@
           <a:bodyPr wrap="square" rtlCol="0" anchor="t"/>
           <a:lstStyle/>
           <a:p>
-            <a:pPr indent="0" marL="0">
+            <a:pPr marL="0" indent="0">
               <a:lnSpc>
                 <a:spcPct val="115000"/>
               </a:lnSpc>
@@ -4543,7 +4439,7 @@
             <a:endParaRPr lang="en-US" sz="1800" dirty="0"/>
           </a:p>
           <a:p>
-            <a:pPr indent="0" marL="0">
+            <a:pPr marL="0" indent="0">
               <a:lnSpc>
                 <a:spcPct val="115000"/>
               </a:lnSpc>
@@ -4563,7 +4459,7 @@
             <a:endParaRPr lang="en-US" sz="1800" dirty="0"/>
           </a:p>
           <a:p>
-            <a:pPr indent="0" marL="0">
+            <a:pPr marL="0" indent="0">
               <a:lnSpc>
                 <a:spcPct val="115000"/>
               </a:lnSpc>
@@ -4583,7 +4479,7 @@
             <a:endParaRPr lang="en-US" sz="1800" dirty="0"/>
           </a:p>
           <a:p>
-            <a:pPr indent="0" marL="0">
+            <a:pPr marL="0" indent="0">
               <a:lnSpc>
                 <a:spcPct val="115000"/>
               </a:lnSpc>
@@ -4625,7 +4521,7 @@
           <a:bodyPr wrap="square" rtlCol="0" anchor="t"/>
           <a:lstStyle/>
           <a:p>
-            <a:pPr indent="0" marL="0">
+            <a:pPr marL="0" indent="0">
               <a:lnSpc>
                 <a:spcPct val="115000"/>
               </a:lnSpc>
@@ -4645,7 +4541,7 @@
             <a:endParaRPr lang="en-US" sz="1800" dirty="0"/>
           </a:p>
           <a:p>
-            <a:pPr indent="0" marL="0">
+            <a:pPr marL="0" indent="0">
               <a:lnSpc>
                 <a:spcPct val="115000"/>
               </a:lnSpc>
@@ -4665,7 +4561,7 @@
             <a:endParaRPr lang="en-US" sz="1800" dirty="0"/>
           </a:p>
           <a:p>
-            <a:pPr indent="0" marL="0">
+            <a:pPr marL="0" indent="0">
               <a:lnSpc>
                 <a:spcPct val="115000"/>
               </a:lnSpc>
@@ -4685,7 +4581,7 @@
             <a:endParaRPr lang="en-US" sz="1800" dirty="0"/>
           </a:p>
           <a:p>
-            <a:pPr indent="0" marL="0">
+            <a:pPr marL="0" indent="0">
               <a:lnSpc>
                 <a:spcPct val="115000"/>
               </a:lnSpc>
@@ -4705,7 +4601,7 @@
             <a:endParaRPr lang="en-US" sz="1800" dirty="0"/>
           </a:p>
           <a:p>
-            <a:pPr indent="0" marL="0">
+            <a:pPr marL="0" indent="0">
               <a:lnSpc>
                 <a:spcPct val="115000"/>
               </a:lnSpc>
@@ -4725,7 +4621,7 @@
             <a:endParaRPr lang="en-US" sz="1800" dirty="0"/>
           </a:p>
           <a:p>
-            <a:pPr indent="0" marL="0">
+            <a:pPr marL="0" indent="0">
               <a:lnSpc>
                 <a:spcPct val="115000"/>
               </a:lnSpc>
@@ -4745,7 +4641,7 @@
             <a:endParaRPr lang="en-US" sz="1800" dirty="0"/>
           </a:p>
           <a:p>
-            <a:pPr indent="0" marL="0">
+            <a:pPr marL="0" indent="0">
               <a:lnSpc>
                 <a:spcPct val="115000"/>
               </a:lnSpc>
@@ -4765,7 +4661,7 @@
             <a:endParaRPr lang="en-US" sz="1800" dirty="0"/>
           </a:p>
           <a:p>
-            <a:pPr indent="0" marL="0">
+            <a:pPr marL="0" indent="0">
               <a:lnSpc>
                 <a:spcPct val="115000"/>
               </a:lnSpc>
@@ -4814,6 +4710,13 @@
             <a:prstDash val="solid"/>
           </a:ln>
         </p:spPr>
+        <p:txBody>
+          <a:bodyPr/>
+          <a:lstStyle/>
+          <a:p>
+            <a:endParaRPr lang="en-US"/>
+          </a:p>
+        </p:txBody>
       </p:sp>
       <p:sp>
         <p:nvSpPr>
@@ -4836,7 +4739,7 @@
           <a:bodyPr wrap="square" rtlCol="0" anchor="ctr"/>
           <a:lstStyle/>
           <a:p>
-            <a:pPr indent="0" marL="0">
+            <a:pPr marL="0" indent="0">
               <a:buNone/>
             </a:pPr>
             <a:r>
@@ -4856,14 +4759,14 @@
       </p:sp>
       <p:pic>
         <p:nvPicPr>
-          <p:cNvPr id="11" name="Image 1" descr="/mnt/data/Code-with-image.png">    </p:cNvPr>
+          <p:cNvPr id="11" name="Image 1" descr="/mnt/data/Code-with-image.png"/>
           <p:cNvPicPr>
             <a:picLocks noChangeAspect="1"/>
           </p:cNvPicPr>
           <p:nvPr/>
         </p:nvPicPr>
         <p:blipFill>
-          <a:blip r:embed="rId2"/>
+          <a:blip r:embed="rId4"/>
           <a:stretch>
             <a:fillRect/>
           </a:stretch>
@@ -4899,7 +4802,7 @@
           <a:bodyPr wrap="square" rtlCol="0" anchor="ctr"/>
           <a:lstStyle/>
           <a:p>
-            <a:pPr indent="0" marL="0">
+            <a:pPr marL="0" indent="0">
               <a:buNone/>
             </a:pPr>
             <a:r>
@@ -4938,7 +4841,7 @@
           <a:bodyPr wrap="square" rtlCol="0" anchor="ctr"/>
           <a:lstStyle/>
           <a:p>
-            <a:pPr algn="ctr" indent="0" marL="0">
+            <a:pPr marL="0" indent="0" algn="ctr">
               <a:buNone/>
             </a:pPr>
             <a:r>
@@ -5257,4 +5160,319 @@
     </a:ext>
   </a:extLst>
 </a:theme>
+</file>
+
+<file path=ppt/theme/theme2.xml><?xml version="1.0" encoding="utf-8"?>
+<a:theme xmlns:a="http://schemas.openxmlformats.org/drawingml/2006/main" name="Office Theme">
+  <a:themeElements>
+    <a:clrScheme name="Office">
+      <a:dk1>
+        <a:sysClr val="windowText" lastClr="000000"/>
+      </a:dk1>
+      <a:lt1>
+        <a:sysClr val="window" lastClr="FFFFFF"/>
+      </a:lt1>
+      <a:dk2>
+        <a:srgbClr val="0E2841"/>
+      </a:dk2>
+      <a:lt2>
+        <a:srgbClr val="E8E8E8"/>
+      </a:lt2>
+      <a:accent1>
+        <a:srgbClr val="156082"/>
+      </a:accent1>
+      <a:accent2>
+        <a:srgbClr val="E97132"/>
+      </a:accent2>
+      <a:accent3>
+        <a:srgbClr val="196B24"/>
+      </a:accent3>
+      <a:accent4>
+        <a:srgbClr val="0F9ED5"/>
+      </a:accent4>
+      <a:accent5>
+        <a:srgbClr val="A02B93"/>
+      </a:accent5>
+      <a:accent6>
+        <a:srgbClr val="4EA72E"/>
+      </a:accent6>
+      <a:hlink>
+        <a:srgbClr val="467886"/>
+      </a:hlink>
+      <a:folHlink>
+        <a:srgbClr val="96607D"/>
+      </a:folHlink>
+    </a:clrScheme>
+    <a:fontScheme name="Office">
+      <a:majorFont>
+        <a:latin typeface="Aptos Display" panose="02110004020202020204"/>
+        <a:ea typeface=""/>
+        <a:cs typeface=""/>
+        <a:font script="Jpan" typeface="游ゴシック Light"/>
+        <a:font script="Hang" typeface="맑은 고딕"/>
+        <a:font script="Hans" typeface="等线 Light"/>
+        <a:font script="Hant" typeface="新細明體"/>
+        <a:font script="Arab" typeface="Times New Roman"/>
+        <a:font script="Hebr" typeface="Times New Roman"/>
+        <a:font script="Thai" typeface="Angsana New"/>
+        <a:font script="Ethi" typeface="Nyala"/>
+        <a:font script="Beng" typeface="Vrinda"/>
+        <a:font script="Gujr" typeface="Shruti"/>
+        <a:font script="Khmr" typeface="MoolBoran"/>
+        <a:font script="Knda" typeface="Tunga"/>
+        <a:font script="Guru" typeface="Raavi"/>
+        <a:font script="Cans" typeface="Euphemia"/>
+        <a:font script="Cher" typeface="Plantagenet Cherokee"/>
+        <a:font script="Yiii" typeface="Microsoft Yi Baiti"/>
+        <a:font script="Tibt" typeface="Microsoft Himalaya"/>
+        <a:font script="Thaa" typeface="MV Boli"/>
+        <a:font script="Deva" typeface="Mangal"/>
+        <a:font script="Telu" typeface="Gautami"/>
+        <a:font script="Taml" typeface="Latha"/>
+        <a:font script="Syrc" typeface="Estrangelo Edessa"/>
+        <a:font script="Orya" typeface="Kalinga"/>
+        <a:font script="Mlym" typeface="Kartika"/>
+        <a:font script="Laoo" typeface="DokChampa"/>
+        <a:font script="Sinh" typeface="Iskoola Pota"/>
+        <a:font script="Mong" typeface="Mongolian Baiti"/>
+        <a:font script="Viet" typeface="Times New Roman"/>
+        <a:font script="Uigh" typeface="Microsoft Uighur"/>
+        <a:font script="Geor" typeface="Sylfaen"/>
+        <a:font script="Armn" typeface="Arial"/>
+        <a:font script="Bugi" typeface="Leelawadee UI"/>
+        <a:font script="Bopo" typeface="Microsoft JhengHei"/>
+        <a:font script="Java" typeface="Javanese Text"/>
+        <a:font script="Lisu" typeface="Segoe UI"/>
+        <a:font script="Mymr" typeface="Myanmar Text"/>
+        <a:font script="Nkoo" typeface="Ebrima"/>
+        <a:font script="Olck" typeface="Nirmala UI"/>
+        <a:font script="Osma" typeface="Ebrima"/>
+        <a:font script="Phag" typeface="Phagspa"/>
+        <a:font script="Syrn" typeface="Estrangelo Edessa"/>
+        <a:font script="Syrj" typeface="Estrangelo Edessa"/>
+        <a:font script="Syre" typeface="Estrangelo Edessa"/>
+        <a:font script="Sora" typeface="Nirmala UI"/>
+        <a:font script="Tale" typeface="Microsoft Tai Le"/>
+        <a:font script="Talu" typeface="Microsoft New Tai Lue"/>
+        <a:font script="Tfng" typeface="Ebrima"/>
+      </a:majorFont>
+      <a:minorFont>
+        <a:latin typeface="Aptos" panose="02110004020202020204"/>
+        <a:ea typeface=""/>
+        <a:cs typeface=""/>
+        <a:font script="Jpan" typeface="游ゴシック"/>
+        <a:font script="Hang" typeface="맑은 고딕"/>
+        <a:font script="Hans" typeface="等线"/>
+        <a:font script="Hant" typeface="新細明體"/>
+        <a:font script="Arab" typeface="Arial"/>
+        <a:font script="Hebr" typeface="Arial"/>
+        <a:font script="Thai" typeface="Cordia New"/>
+        <a:font script="Ethi" typeface="Nyala"/>
+        <a:font script="Beng" typeface="Vrinda"/>
+        <a:font script="Gujr" typeface="Shruti"/>
+        <a:font script="Khmr" typeface="DaunPenh"/>
+        <a:font script="Knda" typeface="Tunga"/>
+        <a:font script="Guru" typeface="Raavi"/>
+        <a:font script="Cans" typeface="Euphemia"/>
+        <a:font script="Cher" typeface="Plantagenet Cherokee"/>
+        <a:font script="Yiii" typeface="Microsoft Yi Baiti"/>
+        <a:font script="Tibt" typeface="Microsoft Himalaya"/>
+        <a:font script="Thaa" typeface="MV Boli"/>
+        <a:font script="Deva" typeface="Mangal"/>
+        <a:font script="Telu" typeface="Gautami"/>
+        <a:font script="Taml" typeface="Latha"/>
+        <a:font script="Syrc" typeface="Estrangelo Edessa"/>
+        <a:font script="Orya" typeface="Kalinga"/>
+        <a:font script="Mlym" typeface="Kartika"/>
+        <a:font script="Laoo" typeface="DokChampa"/>
+        <a:font script="Sinh" typeface="Iskoola Pota"/>
+        <a:font script="Mong" typeface="Mongolian Baiti"/>
+        <a:font script="Viet" typeface="Arial"/>
+        <a:font script="Uigh" typeface="Microsoft Uighur"/>
+        <a:font script="Geor" typeface="Sylfaen"/>
+        <a:font script="Armn" typeface="Arial"/>
+        <a:font script="Bugi" typeface="Leelawadee UI"/>
+        <a:font script="Bopo" typeface="Microsoft JhengHei"/>
+        <a:font script="Java" typeface="Javanese Text"/>
+        <a:font script="Lisu" typeface="Segoe UI"/>
+        <a:font script="Mymr" typeface="Myanmar Text"/>
+        <a:font script="Nkoo" typeface="Ebrima"/>
+        <a:font script="Olck" typeface="Nirmala UI"/>
+        <a:font script="Osma" typeface="Ebrima"/>
+        <a:font script="Phag" typeface="Phagspa"/>
+        <a:font script="Syrn" typeface="Estrangelo Edessa"/>
+        <a:font script="Syrj" typeface="Estrangelo Edessa"/>
+        <a:font script="Syre" typeface="Estrangelo Edessa"/>
+        <a:font script="Sora" typeface="Nirmala UI"/>
+        <a:font script="Tale" typeface="Microsoft Tai Le"/>
+        <a:font script="Talu" typeface="Microsoft New Tai Lue"/>
+        <a:font script="Tfng" typeface="Ebrima"/>
+      </a:minorFont>
+    </a:fontScheme>
+    <a:fmtScheme name="Office">
+      <a:fillStyleLst>
+        <a:solidFill>
+          <a:schemeClr val="phClr"/>
+        </a:solidFill>
+        <a:gradFill rotWithShape="1">
+          <a:gsLst>
+            <a:gs pos="0">
+              <a:schemeClr val="phClr">
+                <a:lumMod val="110000"/>
+                <a:satMod val="105000"/>
+                <a:tint val="67000"/>
+              </a:schemeClr>
+            </a:gs>
+            <a:gs pos="50000">
+              <a:schemeClr val="phClr">
+                <a:lumMod val="105000"/>
+                <a:satMod val="103000"/>
+                <a:tint val="73000"/>
+              </a:schemeClr>
+            </a:gs>
+            <a:gs pos="100000">
+              <a:schemeClr val="phClr">
+                <a:lumMod val="105000"/>
+                <a:satMod val="109000"/>
+                <a:tint val="81000"/>
+              </a:schemeClr>
+            </a:gs>
+          </a:gsLst>
+          <a:lin ang="5400000" scaled="0"/>
+        </a:gradFill>
+        <a:gradFill rotWithShape="1">
+          <a:gsLst>
+            <a:gs pos="0">
+              <a:schemeClr val="phClr">
+                <a:satMod val="103000"/>
+                <a:lumMod val="102000"/>
+                <a:tint val="94000"/>
+              </a:schemeClr>
+            </a:gs>
+            <a:gs pos="50000">
+              <a:schemeClr val="phClr">
+                <a:satMod val="110000"/>
+                <a:lumMod val="100000"/>
+                <a:shade val="100000"/>
+              </a:schemeClr>
+            </a:gs>
+            <a:gs pos="100000">
+              <a:schemeClr val="phClr">
+                <a:lumMod val="99000"/>
+                <a:satMod val="120000"/>
+                <a:shade val="78000"/>
+              </a:schemeClr>
+            </a:gs>
+          </a:gsLst>
+          <a:lin ang="5400000" scaled="0"/>
+        </a:gradFill>
+      </a:fillStyleLst>
+      <a:lnStyleLst>
+        <a:ln w="12700" cap="flat" cmpd="sng" algn="ctr">
+          <a:solidFill>
+            <a:schemeClr val="phClr"/>
+          </a:solidFill>
+          <a:prstDash val="solid"/>
+          <a:miter lim="800000"/>
+        </a:ln>
+        <a:ln w="19050" cap="flat" cmpd="sng" algn="ctr">
+          <a:solidFill>
+            <a:schemeClr val="phClr"/>
+          </a:solidFill>
+          <a:prstDash val="solid"/>
+          <a:miter lim="800000"/>
+        </a:ln>
+        <a:ln w="25400" cap="flat" cmpd="sng" algn="ctr">
+          <a:solidFill>
+            <a:schemeClr val="phClr"/>
+          </a:solidFill>
+          <a:prstDash val="solid"/>
+          <a:miter lim="800000"/>
+        </a:ln>
+      </a:lnStyleLst>
+      <a:effectStyleLst>
+        <a:effectStyle>
+          <a:effectLst/>
+        </a:effectStyle>
+        <a:effectStyle>
+          <a:effectLst/>
+        </a:effectStyle>
+        <a:effectStyle>
+          <a:effectLst>
+            <a:outerShdw blurRad="57150" dist="19050" dir="5400000" algn="ctr" rotWithShape="0">
+              <a:srgbClr val="000000">
+                <a:alpha val="63000"/>
+              </a:srgbClr>
+            </a:outerShdw>
+          </a:effectLst>
+        </a:effectStyle>
+      </a:effectStyleLst>
+      <a:bgFillStyleLst>
+        <a:solidFill>
+          <a:schemeClr val="phClr"/>
+        </a:solidFill>
+        <a:solidFill>
+          <a:schemeClr val="phClr">
+            <a:tint val="95000"/>
+            <a:satMod val="170000"/>
+          </a:schemeClr>
+        </a:solidFill>
+        <a:gradFill rotWithShape="1">
+          <a:gsLst>
+            <a:gs pos="0">
+              <a:schemeClr val="phClr">
+                <a:tint val="93000"/>
+                <a:satMod val="150000"/>
+                <a:shade val="98000"/>
+                <a:lumMod val="102000"/>
+              </a:schemeClr>
+            </a:gs>
+            <a:gs pos="50000">
+              <a:schemeClr val="phClr">
+                <a:tint val="98000"/>
+                <a:satMod val="130000"/>
+                <a:shade val="90000"/>
+                <a:lumMod val="103000"/>
+              </a:schemeClr>
+            </a:gs>
+            <a:gs pos="100000">
+              <a:schemeClr val="phClr">
+                <a:shade val="63000"/>
+                <a:satMod val="120000"/>
+              </a:schemeClr>
+            </a:gs>
+          </a:gsLst>
+          <a:lin ang="5400000" scaled="0"/>
+        </a:gradFill>
+      </a:bgFillStyleLst>
+    </a:fmtScheme>
+  </a:themeElements>
+  <a:objectDefaults>
+    <a:lnDef>
+      <a:spPr/>
+      <a:bodyPr/>
+      <a:lstStyle/>
+      <a:style>
+        <a:lnRef idx="2">
+          <a:schemeClr val="accent1"/>
+        </a:lnRef>
+        <a:fillRef idx="0">
+          <a:schemeClr val="accent1"/>
+        </a:fillRef>
+        <a:effectRef idx="1">
+          <a:schemeClr val="accent1"/>
+        </a:effectRef>
+        <a:fontRef idx="minor">
+          <a:schemeClr val="tx1"/>
+        </a:fontRef>
+      </a:style>
+    </a:lnDef>
+  </a:objectDefaults>
+  <a:extraClrSchemeLst/>
+  <a:extLst>
+    <a:ext uri="{05A4C25C-085E-4340-85A3-A5531E510DB2}">
+      <thm15:themeFamily xmlns:thm15="http://schemas.microsoft.com/office/thememl/2012/main" name="Office Theme" id="{2E142A2C-CD16-42D6-873A-C26D2A0506FA}" vid="{1BDDFF52-6CD6-40A5-AB3C-68EB2F1E4D0A}"/>
+    </a:ext>
+  </a:extLst>
+</a:theme>
 </file>
</xml_diff>